<commit_message>
added subtle glow to outer lines
</commit_message>
<xml_diff>
--- a/resources/invisibox.pptx
+++ b/resources/invisibox.pptx
@@ -4887,7 +4887,7 @@
           </a:ln>
           <a:effectLst>
             <a:glow>
-              <a:schemeClr val="accent1">
+              <a:schemeClr val="bg1">
                 <a:alpha val="40000"/>
               </a:schemeClr>
             </a:glow>
@@ -4950,7 +4950,7 @@
           </a:ln>
           <a:effectLst>
             <a:glow>
-              <a:schemeClr val="accent1">
+              <a:schemeClr val="bg1">
                 <a:alpha val="40000"/>
               </a:schemeClr>
             </a:glow>
@@ -5010,8 +5010,8 @@
             <a:bevel/>
           </a:ln>
           <a:effectLst>
-            <a:glow>
-              <a:schemeClr val="accent1">
+            <a:glow rad="12700">
+              <a:schemeClr val="bg1">
                 <a:alpha val="40000"/>
               </a:schemeClr>
             </a:glow>
@@ -5079,8 +5079,8 @@
             <a:bevel/>
           </a:ln>
           <a:effectLst>
-            <a:glow>
-              <a:schemeClr val="accent1">
+            <a:glow rad="12700">
+              <a:schemeClr val="bg1">
                 <a:alpha val="40000"/>
               </a:schemeClr>
             </a:glow>
@@ -5246,277 +5246,262 @@
           <a:chExt cx="0" cy="0"/>
         </a:xfrm>
       </p:grpSpPr>
-      <p:grpSp>
-        <p:nvGrpSpPr>
-          <p:cNvPr id="8" name="Group 7"/>
-          <p:cNvGrpSpPr/>
+      <p:sp>
+        <p:nvSpPr>
+          <p:cNvPr id="11" name="Trapezoid 10"/>
+          <p:cNvSpPr/>
           <p:nvPr/>
-        </p:nvGrpSpPr>
-        <p:grpSpPr>
+        </p:nvSpPr>
+        <p:spPr>
           <a:xfrm>
-            <a:off x="1725687" y="1706639"/>
-            <a:ext cx="5724296" cy="5437335"/>
-            <a:chOff x="1882848" y="1506615"/>
-            <a:chExt cx="5724296" cy="5437335"/>
+            <a:off x="2285731" y="5404386"/>
+            <a:ext cx="4594304" cy="1739588"/>
           </a:xfrm>
-        </p:grpSpPr>
-        <p:sp>
-          <p:nvSpPr>
-            <p:cNvPr id="11" name="Trapezoid 10"/>
-            <p:cNvSpPr/>
-            <p:nvPr/>
-          </p:nvSpPr>
-          <p:spPr>
-            <a:xfrm>
-              <a:off x="2442892" y="5204362"/>
-              <a:ext cx="4594304" cy="1739588"/>
-            </a:xfrm>
-            <a:prstGeom prst="trapezoid">
-              <a:avLst>
-                <a:gd name="adj" fmla="val 38675"/>
-              </a:avLst>
-            </a:prstGeom>
-            <a:noFill/>
-            <a:ln w="76200" cap="sq">
-              <a:solidFill>
-                <a:schemeClr val="bg1">
-                  <a:alpha val="25000"/>
-                </a:schemeClr>
-              </a:solidFill>
-              <a:bevel/>
-            </a:ln>
-            <a:effectLst>
-              <a:glow>
-                <a:schemeClr val="accent1">
-                  <a:alpha val="40000"/>
-                </a:schemeClr>
-              </a:glow>
-            </a:effectLst>
-          </p:spPr>
-          <p:style>
-            <a:lnRef idx="2">
-              <a:schemeClr val="accent1">
-                <a:shade val="50000"/>
+          <a:prstGeom prst="trapezoid">
+            <a:avLst>
+              <a:gd name="adj" fmla="val 38675"/>
+            </a:avLst>
+          </a:prstGeom>
+          <a:noFill/>
+          <a:ln w="76200" cap="sq">
+            <a:solidFill>
+              <a:schemeClr val="bg1">
+                <a:alpha val="25000"/>
               </a:schemeClr>
-            </a:lnRef>
-            <a:fillRef idx="1">
-              <a:schemeClr val="accent1"/>
-            </a:fillRef>
-            <a:effectRef idx="0">
-              <a:schemeClr val="accent1"/>
-            </a:effectRef>
-            <a:fontRef idx="minor">
-              <a:schemeClr val="lt1"/>
-            </a:fontRef>
-          </p:style>
-          <p:txBody>
-            <a:bodyPr rot="0" spcFirstLastPara="0" vertOverflow="overflow" horzOverflow="overflow" vert="horz" wrap="square" lIns="121920" tIns="60960" rIns="121920" bIns="60960" numCol="1" spcCol="0" rtlCol="0" fromWordArt="0" anchor="ctr" anchorCtr="0" forceAA="0" compatLnSpc="1">
-              <a:prstTxWarp prst="textNoShape">
-                <a:avLst/>
-              </a:prstTxWarp>
-              <a:noAutofit/>
-            </a:bodyPr>
-            <a:lstStyle/>
-            <a:p>
-              <a:pPr algn="ctr"/>
-              <a:endParaRPr lang="en-US" sz="2400"/>
-            </a:p>
-          </p:txBody>
-        </p:sp>
-        <p:sp>
-          <p:nvSpPr>
-            <p:cNvPr id="12" name="Trapezoid 11"/>
-            <p:cNvSpPr/>
-            <p:nvPr/>
-          </p:nvSpPr>
-          <p:spPr>
-            <a:xfrm rot="10800000">
-              <a:off x="2917693" y="1506615"/>
-              <a:ext cx="3648505" cy="3697744"/>
-            </a:xfrm>
-            <a:prstGeom prst="trapezoid">
-              <a:avLst>
-                <a:gd name="adj" fmla="val 5398"/>
-              </a:avLst>
-            </a:prstGeom>
-            <a:noFill/>
-            <a:ln w="76200" cap="sq">
-              <a:solidFill>
-                <a:schemeClr val="bg1">
-                  <a:alpha val="25000"/>
-                </a:schemeClr>
-              </a:solidFill>
-              <a:bevel/>
-            </a:ln>
-            <a:effectLst>
-              <a:glow>
-                <a:schemeClr val="accent1">
-                  <a:alpha val="40000"/>
-                </a:schemeClr>
-              </a:glow>
-            </a:effectLst>
-          </p:spPr>
-          <p:style>
-            <a:lnRef idx="2">
-              <a:schemeClr val="accent1">
-                <a:shade val="50000"/>
+            </a:solidFill>
+            <a:bevel/>
+          </a:ln>
+          <a:effectLst>
+            <a:glow>
+              <a:schemeClr val="bg1">
+                <a:alpha val="40000"/>
               </a:schemeClr>
-            </a:lnRef>
-            <a:fillRef idx="1">
-              <a:schemeClr val="accent1"/>
-            </a:fillRef>
-            <a:effectRef idx="0">
-              <a:schemeClr val="accent1"/>
-            </a:effectRef>
-            <a:fontRef idx="minor">
-              <a:schemeClr val="lt1"/>
-            </a:fontRef>
-          </p:style>
-          <p:txBody>
-            <a:bodyPr rot="0" spcFirstLastPara="0" vertOverflow="overflow" horzOverflow="overflow" vert="horz" wrap="square" lIns="121920" tIns="60960" rIns="121920" bIns="60960" numCol="1" spcCol="0" rtlCol="0" fromWordArt="0" anchor="ctr" anchorCtr="0" forceAA="0" compatLnSpc="1">
-              <a:prstTxWarp prst="textNoShape">
-                <a:avLst/>
-              </a:prstTxWarp>
-              <a:noAutofit/>
-            </a:bodyPr>
-            <a:lstStyle/>
-            <a:p>
-              <a:pPr algn="ctr"/>
-              <a:endParaRPr lang="en-US" sz="2400"/>
-            </a:p>
-          </p:txBody>
-        </p:sp>
-        <p:sp>
-          <p:nvSpPr>
-            <p:cNvPr id="14" name="Trapezoid 13"/>
-            <p:cNvSpPr/>
-            <p:nvPr/>
-          </p:nvSpPr>
-          <p:spPr>
-            <a:xfrm rot="10800000">
-              <a:off x="1882850" y="3003848"/>
-              <a:ext cx="5724293" cy="3940101"/>
-            </a:xfrm>
-            <a:prstGeom prst="trapezoid">
-              <a:avLst>
-                <a:gd name="adj" fmla="val 14321"/>
-              </a:avLst>
-            </a:prstGeom>
-            <a:noFill/>
-            <a:ln w="114300" cap="sq">
-              <a:solidFill>
-                <a:schemeClr val="bg1"/>
-              </a:solidFill>
-              <a:bevel/>
-            </a:ln>
-            <a:effectLst>
-              <a:glow>
-                <a:schemeClr val="accent1">
-                  <a:alpha val="40000"/>
-                </a:schemeClr>
-              </a:glow>
-              <a:reflection blurRad="6350" stA="52000" endA="300" endPos="35000" dir="5400000" sy="-100000" algn="bl" rotWithShape="0"/>
-            </a:effectLst>
-            <a:scene3d>
-              <a:camera prst="orthographicFront">
-                <a:rot lat="0" lon="0" rev="0"/>
-              </a:camera>
-              <a:lightRig rig="threePt" dir="t"/>
-            </a:scene3d>
-            <a:sp3d/>
-          </p:spPr>
-          <p:style>
-            <a:lnRef idx="2">
-              <a:schemeClr val="accent1">
-                <a:shade val="50000"/>
+            </a:glow>
+          </a:effectLst>
+        </p:spPr>
+        <p:style>
+          <a:lnRef idx="2">
+            <a:schemeClr val="accent1">
+              <a:shade val="50000"/>
+            </a:schemeClr>
+          </a:lnRef>
+          <a:fillRef idx="1">
+            <a:schemeClr val="accent1"/>
+          </a:fillRef>
+          <a:effectRef idx="0">
+            <a:schemeClr val="accent1"/>
+          </a:effectRef>
+          <a:fontRef idx="minor">
+            <a:schemeClr val="lt1"/>
+          </a:fontRef>
+        </p:style>
+        <p:txBody>
+          <a:bodyPr rot="0" spcFirstLastPara="0" vertOverflow="overflow" horzOverflow="overflow" vert="horz" wrap="square" lIns="121920" tIns="60960" rIns="121920" bIns="60960" numCol="1" spcCol="0" rtlCol="0" fromWordArt="0" anchor="ctr" anchorCtr="0" forceAA="0" compatLnSpc="1">
+            <a:prstTxWarp prst="textNoShape">
+              <a:avLst/>
+            </a:prstTxWarp>
+            <a:noAutofit/>
+          </a:bodyPr>
+          <a:lstStyle/>
+          <a:p>
+            <a:pPr algn="ctr"/>
+            <a:endParaRPr lang="en-US" sz="2400"/>
+          </a:p>
+        </p:txBody>
+      </p:sp>
+      <p:sp>
+        <p:nvSpPr>
+          <p:cNvPr id="12" name="Trapezoid 11"/>
+          <p:cNvSpPr/>
+          <p:nvPr/>
+        </p:nvSpPr>
+        <p:spPr>
+          <a:xfrm rot="10800000">
+            <a:off x="2760532" y="1706639"/>
+            <a:ext cx="3648505" cy="3697744"/>
+          </a:xfrm>
+          <a:prstGeom prst="trapezoid">
+            <a:avLst>
+              <a:gd name="adj" fmla="val 5398"/>
+            </a:avLst>
+          </a:prstGeom>
+          <a:noFill/>
+          <a:ln w="76200" cap="sq">
+            <a:solidFill>
+              <a:schemeClr val="bg1">
+                <a:alpha val="25000"/>
               </a:schemeClr>
-            </a:lnRef>
-            <a:fillRef idx="1">
-              <a:schemeClr val="accent1"/>
-            </a:fillRef>
-            <a:effectRef idx="0">
-              <a:schemeClr val="accent1"/>
-            </a:effectRef>
-            <a:fontRef idx="minor">
-              <a:schemeClr val="lt1"/>
-            </a:fontRef>
-          </p:style>
-          <p:txBody>
-            <a:bodyPr rot="0" spcFirstLastPara="0" vertOverflow="overflow" horzOverflow="overflow" vert="horz" wrap="square" lIns="121920" tIns="60960" rIns="121920" bIns="60960" numCol="1" spcCol="0" rtlCol="0" fromWordArt="0" anchor="ctr" anchorCtr="0" forceAA="0" compatLnSpc="1">
-              <a:prstTxWarp prst="textNoShape">
-                <a:avLst/>
-              </a:prstTxWarp>
-              <a:noAutofit/>
-            </a:bodyPr>
-            <a:lstStyle/>
-            <a:p>
-              <a:pPr algn="ctr"/>
-              <a:endParaRPr lang="en-US" sz="2400"/>
-            </a:p>
-          </p:txBody>
-        </p:sp>
-        <p:sp>
-          <p:nvSpPr>
-            <p:cNvPr id="16" name="Trapezoid 15"/>
-            <p:cNvSpPr/>
-            <p:nvPr/>
-          </p:nvSpPr>
-          <p:spPr>
-            <a:xfrm>
-              <a:off x="1882848" y="1506617"/>
-              <a:ext cx="5724296" cy="1497231"/>
-            </a:xfrm>
-            <a:prstGeom prst="trapezoid">
-              <a:avLst>
-                <a:gd name="adj" fmla="val 69004"/>
-              </a:avLst>
-            </a:prstGeom>
-            <a:noFill/>
-            <a:ln w="114300" cap="sq">
-              <a:solidFill>
-                <a:schemeClr val="bg1"/>
-              </a:solidFill>
-              <a:bevel/>
-            </a:ln>
-            <a:effectLst>
-              <a:glow>
-                <a:schemeClr val="accent1">
-                  <a:alpha val="40000"/>
-                </a:schemeClr>
-              </a:glow>
-            </a:effectLst>
-          </p:spPr>
-          <p:style>
-            <a:lnRef idx="2">
-              <a:schemeClr val="accent1">
-                <a:shade val="50000"/>
+            </a:solidFill>
+            <a:bevel/>
+          </a:ln>
+          <a:effectLst>
+            <a:glow>
+              <a:schemeClr val="bg1">
+                <a:alpha val="40000"/>
               </a:schemeClr>
-            </a:lnRef>
-            <a:fillRef idx="1">
-              <a:schemeClr val="accent1"/>
-            </a:fillRef>
-            <a:effectRef idx="0">
-              <a:schemeClr val="accent1"/>
-            </a:effectRef>
-            <a:fontRef idx="minor">
-              <a:schemeClr val="lt1"/>
-            </a:fontRef>
-          </p:style>
-          <p:txBody>
-            <a:bodyPr rot="0" spcFirstLastPara="0" vertOverflow="overflow" horzOverflow="overflow" vert="horz" wrap="square" lIns="121920" tIns="60960" rIns="121920" bIns="60960" numCol="1" spcCol="0" rtlCol="0" fromWordArt="0" anchor="ctr" anchorCtr="0" forceAA="0" compatLnSpc="1">
-              <a:prstTxWarp prst="textNoShape">
-                <a:avLst/>
-              </a:prstTxWarp>
-              <a:noAutofit/>
-            </a:bodyPr>
-            <a:lstStyle/>
-            <a:p>
-              <a:pPr algn="ctr"/>
-              <a:endParaRPr lang="en-US" sz="2400"/>
-            </a:p>
-          </p:txBody>
-        </p:sp>
-      </p:grpSp>
+            </a:glow>
+          </a:effectLst>
+        </p:spPr>
+        <p:style>
+          <a:lnRef idx="2">
+            <a:schemeClr val="accent1">
+              <a:shade val="50000"/>
+            </a:schemeClr>
+          </a:lnRef>
+          <a:fillRef idx="1">
+            <a:schemeClr val="accent1"/>
+          </a:fillRef>
+          <a:effectRef idx="0">
+            <a:schemeClr val="accent1"/>
+          </a:effectRef>
+          <a:fontRef idx="minor">
+            <a:schemeClr val="lt1"/>
+          </a:fontRef>
+        </p:style>
+        <p:txBody>
+          <a:bodyPr rot="0" spcFirstLastPara="0" vertOverflow="overflow" horzOverflow="overflow" vert="horz" wrap="square" lIns="121920" tIns="60960" rIns="121920" bIns="60960" numCol="1" spcCol="0" rtlCol="0" fromWordArt="0" anchor="ctr" anchorCtr="0" forceAA="0" compatLnSpc="1">
+            <a:prstTxWarp prst="textNoShape">
+              <a:avLst/>
+            </a:prstTxWarp>
+            <a:noAutofit/>
+          </a:bodyPr>
+          <a:lstStyle/>
+          <a:p>
+            <a:pPr algn="ctr"/>
+            <a:endParaRPr lang="en-US" sz="2400"/>
+          </a:p>
+        </p:txBody>
+      </p:sp>
+      <p:sp>
+        <p:nvSpPr>
+          <p:cNvPr id="14" name="Trapezoid 13"/>
+          <p:cNvSpPr/>
+          <p:nvPr/>
+        </p:nvSpPr>
+        <p:spPr>
+          <a:xfrm rot="10800000">
+            <a:off x="1725689" y="3203872"/>
+            <a:ext cx="5724293" cy="3940101"/>
+          </a:xfrm>
+          <a:prstGeom prst="trapezoid">
+            <a:avLst>
+              <a:gd name="adj" fmla="val 14321"/>
+            </a:avLst>
+          </a:prstGeom>
+          <a:noFill/>
+          <a:ln w="114300" cap="sq">
+            <a:solidFill>
+              <a:schemeClr val="bg1"/>
+            </a:solidFill>
+            <a:bevel/>
+          </a:ln>
+          <a:effectLst>
+            <a:glow rad="12700">
+              <a:schemeClr val="bg1">
+                <a:alpha val="40000"/>
+              </a:schemeClr>
+            </a:glow>
+            <a:reflection blurRad="6350" stA="52000" endA="300" endPos="35000" dir="5400000" sy="-100000" algn="bl" rotWithShape="0"/>
+          </a:effectLst>
+          <a:scene3d>
+            <a:camera prst="orthographicFront">
+              <a:rot lat="0" lon="0" rev="0"/>
+            </a:camera>
+            <a:lightRig rig="threePt" dir="t"/>
+          </a:scene3d>
+          <a:sp3d/>
+        </p:spPr>
+        <p:style>
+          <a:lnRef idx="2">
+            <a:schemeClr val="accent1">
+              <a:shade val="50000"/>
+            </a:schemeClr>
+          </a:lnRef>
+          <a:fillRef idx="1">
+            <a:schemeClr val="accent1"/>
+          </a:fillRef>
+          <a:effectRef idx="0">
+            <a:schemeClr val="accent1"/>
+          </a:effectRef>
+          <a:fontRef idx="minor">
+            <a:schemeClr val="lt1"/>
+          </a:fontRef>
+        </p:style>
+        <p:txBody>
+          <a:bodyPr rot="0" spcFirstLastPara="0" vertOverflow="overflow" horzOverflow="overflow" vert="horz" wrap="square" lIns="121920" tIns="60960" rIns="121920" bIns="60960" numCol="1" spcCol="0" rtlCol="0" fromWordArt="0" anchor="ctr" anchorCtr="0" forceAA="0" compatLnSpc="1">
+            <a:prstTxWarp prst="textNoShape">
+              <a:avLst/>
+            </a:prstTxWarp>
+            <a:noAutofit/>
+          </a:bodyPr>
+          <a:lstStyle/>
+          <a:p>
+            <a:pPr algn="ctr"/>
+            <a:endParaRPr lang="en-US" sz="2400"/>
+          </a:p>
+        </p:txBody>
+      </p:sp>
+      <p:sp>
+        <p:nvSpPr>
+          <p:cNvPr id="16" name="Trapezoid 15"/>
+          <p:cNvSpPr/>
+          <p:nvPr/>
+        </p:nvSpPr>
+        <p:spPr>
+          <a:xfrm>
+            <a:off x="1725687" y="1706641"/>
+            <a:ext cx="5724296" cy="1497231"/>
+          </a:xfrm>
+          <a:prstGeom prst="trapezoid">
+            <a:avLst>
+              <a:gd name="adj" fmla="val 69004"/>
+            </a:avLst>
+          </a:prstGeom>
+          <a:noFill/>
+          <a:ln w="114300" cap="sq">
+            <a:solidFill>
+              <a:schemeClr val="bg1"/>
+            </a:solidFill>
+            <a:bevel/>
+          </a:ln>
+          <a:effectLst>
+            <a:glow rad="12700">
+              <a:schemeClr val="bg1">
+                <a:alpha val="40000"/>
+              </a:schemeClr>
+            </a:glow>
+          </a:effectLst>
+        </p:spPr>
+        <p:style>
+          <a:lnRef idx="2">
+            <a:schemeClr val="accent1">
+              <a:shade val="50000"/>
+            </a:schemeClr>
+          </a:lnRef>
+          <a:fillRef idx="1">
+            <a:schemeClr val="accent1"/>
+          </a:fillRef>
+          <a:effectRef idx="0">
+            <a:schemeClr val="accent1"/>
+          </a:effectRef>
+          <a:fontRef idx="minor">
+            <a:schemeClr val="lt1"/>
+          </a:fontRef>
+        </p:style>
+        <p:txBody>
+          <a:bodyPr rot="0" spcFirstLastPara="0" vertOverflow="overflow" horzOverflow="overflow" vert="horz" wrap="square" lIns="121920" tIns="60960" rIns="121920" bIns="60960" numCol="1" spcCol="0" rtlCol="0" fromWordArt="0" anchor="ctr" anchorCtr="0" forceAA="0" compatLnSpc="1">
+            <a:prstTxWarp prst="textNoShape">
+              <a:avLst/>
+            </a:prstTxWarp>
+            <a:noAutofit/>
+          </a:bodyPr>
+          <a:lstStyle/>
+          <a:p>
+            <a:pPr algn="ctr"/>
+            <a:endParaRPr lang="en-US" sz="2400"/>
+          </a:p>
+        </p:txBody>
+      </p:sp>
     </p:spTree>
     <p:extLst>
       <p:ext uri="{BB962C8B-B14F-4D97-AF65-F5344CB8AC3E}">

</xml_diff>

<commit_message>
added bw logos for labels
</commit_message>
<xml_diff>
--- a/resources/invisibox.pptx
+++ b/resources/invisibox.pptx
@@ -5,7 +5,7 @@
     <p:sldMasterId id="2147483660" r:id="rId1"/>
   </p:sldMasterIdLst>
   <p:notesMasterIdLst>
-    <p:notesMasterId r:id="rId8"/>
+    <p:notesMasterId r:id="rId9"/>
   </p:notesMasterIdLst>
   <p:sldIdLst>
     <p:sldId id="260" r:id="rId2"/>
@@ -13,7 +13,8 @@
     <p:sldId id="273" r:id="rId4"/>
     <p:sldId id="265" r:id="rId5"/>
     <p:sldId id="271" r:id="rId6"/>
-    <p:sldId id="267" r:id="rId7"/>
+    <p:sldId id="274" r:id="rId7"/>
+    <p:sldId id="267" r:id="rId8"/>
   </p:sldIdLst>
   <p:sldSz cx="9144000" cy="9144000"/>
   <p:notesSz cx="6858000" cy="9144000"/>
@@ -202,7 +203,7 @@
           <a:p>
             <a:fld id="{002CFD18-7081-8540-B3D9-73F60589FEE5}" type="datetimeFigureOut">
               <a:rPr lang="en-US" smtClean="0"/>
-              <a:t>3/30/17</a:t>
+              <a:t>4/3/17</a:t>
             </a:fld>
             <a:endParaRPr lang="en-US"/>
           </a:p>
@@ -779,7 +780,7 @@
           <a:p>
             <a:fld id="{5AE7C0BC-F65D-5743-B6AA-9222A5F0C9E1}" type="datetimeFigureOut">
               <a:rPr lang="en-US" smtClean="0"/>
-              <a:t>3/30/17</a:t>
+              <a:t>4/3/17</a:t>
             </a:fld>
             <a:endParaRPr lang="en-US"/>
           </a:p>
@@ -944,7 +945,7 @@
           <a:p>
             <a:fld id="{5AE7C0BC-F65D-5743-B6AA-9222A5F0C9E1}" type="datetimeFigureOut">
               <a:rPr lang="en-US" smtClean="0"/>
-              <a:t>3/30/17</a:t>
+              <a:t>4/3/17</a:t>
             </a:fld>
             <a:endParaRPr lang="en-US"/>
           </a:p>
@@ -1119,7 +1120,7 @@
           <a:p>
             <a:fld id="{5AE7C0BC-F65D-5743-B6AA-9222A5F0C9E1}" type="datetimeFigureOut">
               <a:rPr lang="en-US" smtClean="0"/>
-              <a:t>3/30/17</a:t>
+              <a:t>4/3/17</a:t>
             </a:fld>
             <a:endParaRPr lang="en-US"/>
           </a:p>
@@ -1284,7 +1285,7 @@
           <a:p>
             <a:fld id="{5AE7C0BC-F65D-5743-B6AA-9222A5F0C9E1}" type="datetimeFigureOut">
               <a:rPr lang="en-US" smtClean="0"/>
-              <a:t>3/30/17</a:t>
+              <a:t>4/3/17</a:t>
             </a:fld>
             <a:endParaRPr lang="en-US"/>
           </a:p>
@@ -1523,7 +1524,7 @@
           <a:p>
             <a:fld id="{5AE7C0BC-F65D-5743-B6AA-9222A5F0C9E1}" type="datetimeFigureOut">
               <a:rPr lang="en-US" smtClean="0"/>
-              <a:t>3/30/17</a:t>
+              <a:t>4/3/17</a:t>
             </a:fld>
             <a:endParaRPr lang="en-US"/>
           </a:p>
@@ -1750,7 +1751,7 @@
           <a:p>
             <a:fld id="{5AE7C0BC-F65D-5743-B6AA-9222A5F0C9E1}" type="datetimeFigureOut">
               <a:rPr lang="en-US" smtClean="0"/>
-              <a:t>3/30/17</a:t>
+              <a:t>4/3/17</a:t>
             </a:fld>
             <a:endParaRPr lang="en-US"/>
           </a:p>
@@ -2112,7 +2113,7 @@
           <a:p>
             <a:fld id="{5AE7C0BC-F65D-5743-B6AA-9222A5F0C9E1}" type="datetimeFigureOut">
               <a:rPr lang="en-US" smtClean="0"/>
-              <a:t>3/30/17</a:t>
+              <a:t>4/3/17</a:t>
             </a:fld>
             <a:endParaRPr lang="en-US"/>
           </a:p>
@@ -2225,7 +2226,7 @@
           <a:p>
             <a:fld id="{5AE7C0BC-F65D-5743-B6AA-9222A5F0C9E1}" type="datetimeFigureOut">
               <a:rPr lang="en-US" smtClean="0"/>
-              <a:t>3/30/17</a:t>
+              <a:t>4/3/17</a:t>
             </a:fld>
             <a:endParaRPr lang="en-US"/>
           </a:p>
@@ -2315,7 +2316,7 @@
           <a:p>
             <a:fld id="{5AE7C0BC-F65D-5743-B6AA-9222A5F0C9E1}" type="datetimeFigureOut">
               <a:rPr lang="en-US" smtClean="0"/>
-              <a:t>3/30/17</a:t>
+              <a:t>4/3/17</a:t>
             </a:fld>
             <a:endParaRPr lang="en-US"/>
           </a:p>
@@ -2587,7 +2588,7 @@
           <a:p>
             <a:fld id="{5AE7C0BC-F65D-5743-B6AA-9222A5F0C9E1}" type="datetimeFigureOut">
               <a:rPr lang="en-US" smtClean="0"/>
-              <a:t>3/30/17</a:t>
+              <a:t>4/3/17</a:t>
             </a:fld>
             <a:endParaRPr lang="en-US"/>
           </a:p>
@@ -2839,7 +2840,7 @@
           <a:p>
             <a:fld id="{5AE7C0BC-F65D-5743-B6AA-9222A5F0C9E1}" type="datetimeFigureOut">
               <a:rPr lang="en-US" smtClean="0"/>
-              <a:t>3/30/17</a:t>
+              <a:t>4/3/17</a:t>
             </a:fld>
             <a:endParaRPr lang="en-US"/>
           </a:p>
@@ -3047,7 +3048,7 @@
           <a:p>
             <a:fld id="{5AE7C0BC-F65D-5743-B6AA-9222A5F0C9E1}" type="datetimeFigureOut">
               <a:rPr lang="en-US" smtClean="0"/>
-              <a:t>3/30/17</a:t>
+              <a:t>4/3/17</a:t>
             </a:fld>
             <a:endParaRPr lang="en-US"/>
           </a:p>
@@ -5196,6 +5197,364 @@
 </file>
 
 <file path=ppt/slides/slide6.xml><?xml version="1.0" encoding="utf-8"?>
+<p:sld xmlns:a="http://schemas.openxmlformats.org/drawingml/2006/main" xmlns:r="http://schemas.openxmlformats.org/officeDocument/2006/relationships" xmlns:p="http://schemas.openxmlformats.org/presentationml/2006/main">
+  <p:cSld>
+    <p:bg>
+      <p:bgPr>
+        <a:solidFill>
+          <a:schemeClr val="bg1"/>
+        </a:solidFill>
+        <a:effectLst/>
+      </p:bgPr>
+    </p:bg>
+    <p:spTree>
+      <p:nvGrpSpPr>
+        <p:cNvPr id="1" name=""/>
+        <p:cNvGrpSpPr/>
+        <p:nvPr/>
+      </p:nvGrpSpPr>
+      <p:grpSpPr>
+        <a:xfrm>
+          <a:off x="0" y="0"/>
+          <a:ext cx="0" cy="0"/>
+          <a:chOff x="0" y="0"/>
+          <a:chExt cx="0" cy="0"/>
+        </a:xfrm>
+      </p:grpSpPr>
+      <p:sp>
+        <p:nvSpPr>
+          <p:cNvPr id="4" name="Trapezoid 3"/>
+          <p:cNvSpPr/>
+          <p:nvPr/>
+        </p:nvSpPr>
+        <p:spPr>
+          <a:xfrm>
+            <a:off x="1826168" y="4946291"/>
+            <a:ext cx="5470025" cy="2071170"/>
+          </a:xfrm>
+          <a:prstGeom prst="trapezoid">
+            <a:avLst>
+              <a:gd name="adj" fmla="val 38675"/>
+            </a:avLst>
+          </a:prstGeom>
+          <a:noFill/>
+          <a:ln w="38100" cap="sq">
+            <a:solidFill>
+              <a:schemeClr val="tx1"/>
+            </a:solidFill>
+            <a:bevel/>
+          </a:ln>
+          <a:effectLst>
+            <a:glow>
+              <a:schemeClr val="bg1">
+                <a:alpha val="40000"/>
+              </a:schemeClr>
+            </a:glow>
+          </a:effectLst>
+        </p:spPr>
+        <p:style>
+          <a:lnRef idx="2">
+            <a:schemeClr val="accent1">
+              <a:shade val="50000"/>
+            </a:schemeClr>
+          </a:lnRef>
+          <a:fillRef idx="1">
+            <a:schemeClr val="accent1"/>
+          </a:fillRef>
+          <a:effectRef idx="0">
+            <a:schemeClr val="accent1"/>
+          </a:effectRef>
+          <a:fontRef idx="minor">
+            <a:schemeClr val="lt1"/>
+          </a:fontRef>
+        </p:style>
+        <p:txBody>
+          <a:bodyPr rot="0" spcFirstLastPara="0" vertOverflow="overflow" horzOverflow="overflow" vert="horz" wrap="square" lIns="121920" tIns="60960" rIns="121920" bIns="60960" numCol="1" spcCol="0" rtlCol="0" fromWordArt="0" anchor="ctr" anchorCtr="0" forceAA="0" compatLnSpc="1">
+            <a:prstTxWarp prst="textNoShape">
+              <a:avLst/>
+            </a:prstTxWarp>
+            <a:noAutofit/>
+          </a:bodyPr>
+          <a:lstStyle/>
+          <a:p>
+            <a:pPr algn="ctr"/>
+            <a:endParaRPr lang="en-US" sz="2400"/>
+          </a:p>
+        </p:txBody>
+      </p:sp>
+      <p:sp>
+        <p:nvSpPr>
+          <p:cNvPr id="5" name="Trapezoid 4"/>
+          <p:cNvSpPr/>
+          <p:nvPr/>
+        </p:nvSpPr>
+        <p:spPr>
+          <a:xfrm rot="10800000">
+            <a:off x="2391472" y="543713"/>
+            <a:ext cx="4343948" cy="4402571"/>
+          </a:xfrm>
+          <a:prstGeom prst="trapezoid">
+            <a:avLst>
+              <a:gd name="adj" fmla="val 5398"/>
+            </a:avLst>
+          </a:prstGeom>
+          <a:noFill/>
+          <a:ln w="38100" cap="sq">
+            <a:solidFill>
+              <a:schemeClr val="tx1"/>
+            </a:solidFill>
+            <a:bevel/>
+          </a:ln>
+          <a:effectLst>
+            <a:glow>
+              <a:schemeClr val="bg1">
+                <a:alpha val="40000"/>
+              </a:schemeClr>
+            </a:glow>
+          </a:effectLst>
+        </p:spPr>
+        <p:style>
+          <a:lnRef idx="2">
+            <a:schemeClr val="accent1">
+              <a:shade val="50000"/>
+            </a:schemeClr>
+          </a:lnRef>
+          <a:fillRef idx="1">
+            <a:schemeClr val="accent1"/>
+          </a:fillRef>
+          <a:effectRef idx="0">
+            <a:schemeClr val="accent1"/>
+          </a:effectRef>
+          <a:fontRef idx="minor">
+            <a:schemeClr val="lt1"/>
+          </a:fontRef>
+        </p:style>
+        <p:txBody>
+          <a:bodyPr rot="0" spcFirstLastPara="0" vertOverflow="overflow" horzOverflow="overflow" vert="horz" wrap="square" lIns="121920" tIns="60960" rIns="121920" bIns="60960" numCol="1" spcCol="0" rtlCol="0" fromWordArt="0" anchor="ctr" anchorCtr="0" forceAA="0" compatLnSpc="1">
+            <a:prstTxWarp prst="textNoShape">
+              <a:avLst/>
+            </a:prstTxWarp>
+            <a:noAutofit/>
+          </a:bodyPr>
+          <a:lstStyle/>
+          <a:p>
+            <a:pPr algn="ctr"/>
+            <a:endParaRPr lang="en-US" sz="2400"/>
+          </a:p>
+        </p:txBody>
+      </p:sp>
+      <p:sp>
+        <p:nvSpPr>
+          <p:cNvPr id="6" name="Trapezoid 5"/>
+          <p:cNvSpPr/>
+          <p:nvPr/>
+        </p:nvSpPr>
+        <p:spPr>
+          <a:xfrm rot="10800000">
+            <a:off x="1159379" y="2326337"/>
+            <a:ext cx="6815403" cy="4691124"/>
+          </a:xfrm>
+          <a:prstGeom prst="trapezoid">
+            <a:avLst>
+              <a:gd name="adj" fmla="val 14321"/>
+            </a:avLst>
+          </a:prstGeom>
+          <a:noFill/>
+          <a:ln w="117475" cap="sq">
+            <a:solidFill>
+              <a:schemeClr val="tx1"/>
+            </a:solidFill>
+            <a:bevel/>
+          </a:ln>
+          <a:effectLst>
+            <a:glow rad="12700">
+              <a:schemeClr val="bg1">
+                <a:alpha val="40000"/>
+              </a:schemeClr>
+            </a:glow>
+            <a:reflection blurRad="6350" stA="0" endPos="35000" dir="5400000" sy="-100000" algn="bl" rotWithShape="0"/>
+          </a:effectLst>
+          <a:scene3d>
+            <a:camera prst="orthographicFront">
+              <a:rot lat="0" lon="0" rev="0"/>
+            </a:camera>
+            <a:lightRig rig="threePt" dir="t"/>
+          </a:scene3d>
+          <a:sp3d/>
+        </p:spPr>
+        <p:style>
+          <a:lnRef idx="2">
+            <a:schemeClr val="accent1">
+              <a:shade val="50000"/>
+            </a:schemeClr>
+          </a:lnRef>
+          <a:fillRef idx="1">
+            <a:schemeClr val="accent1"/>
+          </a:fillRef>
+          <a:effectRef idx="0">
+            <a:schemeClr val="accent1"/>
+          </a:effectRef>
+          <a:fontRef idx="minor">
+            <a:schemeClr val="lt1"/>
+          </a:fontRef>
+        </p:style>
+        <p:txBody>
+          <a:bodyPr rot="0" spcFirstLastPara="0" vertOverflow="overflow" horzOverflow="overflow" vert="horz" wrap="square" lIns="121920" tIns="60960" rIns="121920" bIns="60960" numCol="1" spcCol="0" rtlCol="0" fromWordArt="0" anchor="ctr" anchorCtr="0" forceAA="0" compatLnSpc="1">
+            <a:prstTxWarp prst="textNoShape">
+              <a:avLst/>
+            </a:prstTxWarp>
+            <a:noAutofit/>
+          </a:bodyPr>
+          <a:lstStyle/>
+          <a:p>
+            <a:pPr algn="ctr"/>
+            <a:endParaRPr lang="en-US" sz="2400"/>
+          </a:p>
+        </p:txBody>
+      </p:sp>
+      <p:sp>
+        <p:nvSpPr>
+          <p:cNvPr id="7" name="Trapezoid 6"/>
+          <p:cNvSpPr/>
+          <p:nvPr/>
+        </p:nvSpPr>
+        <p:spPr>
+          <a:xfrm>
+            <a:off x="1159377" y="543717"/>
+            <a:ext cx="6815407" cy="1782617"/>
+          </a:xfrm>
+          <a:prstGeom prst="trapezoid">
+            <a:avLst>
+              <a:gd name="adj" fmla="val 69004"/>
+            </a:avLst>
+          </a:prstGeom>
+          <a:noFill/>
+          <a:ln w="117475" cap="sq">
+            <a:solidFill>
+              <a:schemeClr val="tx1"/>
+            </a:solidFill>
+            <a:bevel/>
+          </a:ln>
+          <a:effectLst>
+            <a:glow rad="12700">
+              <a:schemeClr val="bg1">
+                <a:alpha val="40000"/>
+              </a:schemeClr>
+            </a:glow>
+          </a:effectLst>
+        </p:spPr>
+        <p:style>
+          <a:lnRef idx="2">
+            <a:schemeClr val="accent1">
+              <a:shade val="50000"/>
+            </a:schemeClr>
+          </a:lnRef>
+          <a:fillRef idx="1">
+            <a:schemeClr val="accent1"/>
+          </a:fillRef>
+          <a:effectRef idx="0">
+            <a:schemeClr val="accent1"/>
+          </a:effectRef>
+          <a:fontRef idx="minor">
+            <a:schemeClr val="lt1"/>
+          </a:fontRef>
+        </p:style>
+        <p:txBody>
+          <a:bodyPr rot="0" spcFirstLastPara="0" vertOverflow="overflow" horzOverflow="overflow" vert="horz" wrap="square" lIns="121920" tIns="60960" rIns="121920" bIns="60960" numCol="1" spcCol="0" rtlCol="0" fromWordArt="0" anchor="ctr" anchorCtr="0" forceAA="0" compatLnSpc="1">
+            <a:prstTxWarp prst="textNoShape">
+              <a:avLst/>
+            </a:prstTxWarp>
+            <a:noAutofit/>
+          </a:bodyPr>
+          <a:lstStyle/>
+          <a:p>
+            <a:pPr algn="ctr"/>
+            <a:endParaRPr lang="en-US" sz="2400"/>
+          </a:p>
+        </p:txBody>
+      </p:sp>
+      <p:sp>
+        <p:nvSpPr>
+          <p:cNvPr id="13" name="Title 1"/>
+          <p:cNvSpPr txBox="1">
+            <a:spLocks/>
+          </p:cNvSpPr>
+          <p:nvPr/>
+        </p:nvSpPr>
+        <p:spPr>
+          <a:xfrm>
+            <a:off x="-3566820" y="7901453"/>
+            <a:ext cx="16256000" cy="444005"/>
+          </a:xfrm>
+          <a:prstGeom prst="rect">
+            <a:avLst/>
+          </a:prstGeom>
+          <a:effectLst>
+            <a:reflection stA="0" endPos="50000" dir="5400000" sy="-100000" algn="bl" rotWithShape="0"/>
+          </a:effectLst>
+        </p:spPr>
+        <p:txBody>
+          <a:bodyPr vert="horz" lIns="121920" tIns="60960" rIns="121920" bIns="60960" rtlCol="0" anchor="ctr">
+            <a:noAutofit/>
+          </a:bodyPr>
+          <a:lstStyle>
+            <a:lvl1pPr algn="l" defTabSz="914400" rtl="0" eaLnBrk="1" latinLnBrk="0" hangingPunct="1">
+              <a:lnSpc>
+                <a:spcPct val="90000"/>
+              </a:lnSpc>
+              <a:spcBef>
+                <a:spcPct val="0"/>
+              </a:spcBef>
+              <a:buNone/>
+              <a:defRPr sz="4400" kern="1200">
+                <a:solidFill>
+                  <a:schemeClr val="tx1"/>
+                </a:solidFill>
+                <a:latin typeface="+mj-lt"/>
+                <a:ea typeface="+mj-ea"/>
+                <a:cs typeface="+mj-cs"/>
+              </a:defRPr>
+            </a:lvl1pPr>
+          </a:lstStyle>
+          <a:p>
+            <a:pPr algn="ctr"/>
+            <a:r>
+              <a:rPr lang="en-US" sz="13000" dirty="0" smtClean="0">
+                <a:latin typeface="+mn-lt"/>
+                <a:ea typeface="Gujarati MT" charset="0"/>
+                <a:cs typeface="Gujarati MT" charset="0"/>
+              </a:rPr>
+              <a:t>invisibox </a:t>
+            </a:r>
+            <a:endParaRPr lang="en-US" sz="13000" dirty="0">
+              <a:latin typeface="+mn-lt"/>
+              <a:ea typeface="Gujarati MT" charset="0"/>
+              <a:cs typeface="Gujarati MT" charset="0"/>
+            </a:endParaRPr>
+          </a:p>
+        </p:txBody>
+      </p:sp>
+    </p:spTree>
+    <p:extLst>
+      <p:ext uri="{BB962C8B-B14F-4D97-AF65-F5344CB8AC3E}">
+        <p14:creationId xmlns:p14="http://schemas.microsoft.com/office/powerpoint/2010/main" val="353594727"/>
+      </p:ext>
+    </p:extLst>
+  </p:cSld>
+  <p:clrMapOvr>
+    <a:masterClrMapping/>
+  </p:clrMapOvr>
+  <p:timing>
+    <p:tnLst>
+      <p:par>
+        <p:cTn id="1" dur="indefinite" restart="never" nodeType="tmRoot"/>
+      </p:par>
+    </p:tnLst>
+  </p:timing>
+</p:sld>
+</file>
+
+<file path=ppt/slides/slide7.xml><?xml version="1.0" encoding="utf-8"?>
 <p:sld xmlns:a="http://schemas.openxmlformats.org/drawingml/2006/main" xmlns:r="http://schemas.openxmlformats.org/officeDocument/2006/relationships" xmlns:p="http://schemas.openxmlformats.org/presentationml/2006/main">
   <p:cSld>
     <p:bg>

</xml_diff>